<commit_message>
First Commit with PHENIX Preliminary Plots
</commit_message>
<xml_diff>
--- a/Preliminary Results Slides.pptx
+++ b/Preliminary Results Slides.pptx
@@ -3233,8 +3233,8 @@
           </a:prstGeom>
         </p:spPr>
       </p:pic>
-      <mc:AlternateContent xmlns:mc="http://schemas.openxmlformats.org/markup-compatibility/2006" xmlns:a14="http://schemas.microsoft.com/office/drawing/2010/main">
-        <mc:Choice Requires="a14">
+      <mc:AlternateContent xmlns:mc="http://schemas.openxmlformats.org/markup-compatibility/2006">
+        <mc:Choice xmlns:a14="http://schemas.microsoft.com/office/drawing/2010/main" Requires="a14">
           <p:sp>
             <p:nvSpPr>
               <p:cNvPr id="7" name="TextBox 6">
@@ -3601,11 +3601,65 @@
                       <a:srgbClr val="FF0000"/>
                     </a:solidFill>
                   </a:rPr>
-                  <a:t>After dimuon subtraction</a:t>
+                  <a:t>After dimuon subtraction (removal of autocorrelation of the muons to </a:t>
+                </a:r>
+                <a14:m>
+                  <m:oMath xmlns:m="http://schemas.openxmlformats.org/officeDocument/2006/math">
+                    <m:sSub>
+                      <m:sSubPr>
+                        <m:ctrlPr>
+                          <a:rPr lang="en-US" b="1" i="1" smtClean="0">
+                            <a:solidFill>
+                              <a:srgbClr val="FF0000"/>
+                            </a:solidFill>
+                            <a:latin typeface="Cambria Math" panose="02040503050406030204" pitchFamily="18" charset="0"/>
+                          </a:rPr>
+                        </m:ctrlPr>
+                      </m:sSubPr>
+                      <m:e>
+                        <m:r>
+                          <a:rPr lang="en-US" b="1" i="1" smtClean="0">
+                            <a:solidFill>
+                              <a:srgbClr val="FF0000"/>
+                            </a:solidFill>
+                            <a:latin typeface="Cambria Math" panose="02040503050406030204" pitchFamily="18" charset="0"/>
+                          </a:rPr>
+                          <m:t>𝑵</m:t>
+                        </m:r>
+                      </m:e>
+                      <m:sub>
+                        <m:r>
+                          <a:rPr lang="en-US" b="1" i="1" smtClean="0">
+                            <a:solidFill>
+                              <a:srgbClr val="FF0000"/>
+                            </a:solidFill>
+                            <a:latin typeface="Cambria Math" panose="02040503050406030204" pitchFamily="18" charset="0"/>
+                          </a:rPr>
+                          <m:t>𝒄𝒉</m:t>
+                        </m:r>
+                      </m:sub>
+                    </m:sSub>
+                  </m:oMath>
+                </a14:m>
+                <a:r>
+                  <a:rPr lang="en-US" b="1" dirty="0">
+                    <a:solidFill>
+                      <a:srgbClr val="FF0000"/>
+                    </a:solidFill>
+                  </a:rPr>
+                  <a:t>)</a:t>
                 </a:r>
                 <a:r>
                   <a:rPr lang="en-US" dirty="0"/>
-                  <a:t>, </a:t>
+                  <a:t>,</a:t>
+                </a:r>
+                <a:r>
+                  <a:rPr lang="en-US" b="1" dirty="0">
+                    <a:solidFill>
+                      <a:srgbClr val="FF0000"/>
+                    </a:solidFill>
+                  </a:rPr>
+                  <a:t> </a:t>
                 </a:r>
                 <a14:m>
                   <m:oMath xmlns:m="http://schemas.openxmlformats.org/officeDocument/2006/math">
@@ -3794,7 +3848,7 @@
             </p:txBody>
           </p:sp>
         </mc:Choice>
-        <mc:Fallback xmlns="">
+        <mc:Fallback>
           <p:sp>
             <p:nvSpPr>
               <p:cNvPr id="7" name="TextBox 6">

</xml_diff>